<commit_message>
Updated Power Point correct numbering and add PBI Example
</commit_message>
<xml_diff>
--- a/HigherED BI Solution/Data Validation/Power Point Walkthrough/Deploy Staging.pptx
+++ b/HigherED BI Solution/Data Validation/Power Point Walkthrough/Deploy Staging.pptx
@@ -115,7 +115,16 @@
       </a:defRPr>
     </a:lvl9pPr>
   </p:defaultTextStyle>
+  <p:extLst>
+    <p:ext uri="{EFAFB233-063F-42B5-8137-9DF3F51BA10A}">
+      <p15:sldGuideLst xmlns:p15="http://schemas.microsoft.com/office/powerpoint/2012/main"/>
+    </p:ext>
+  </p:extLst>
 </p:presentation>
+</file>
+
+<file path=ppt/revisionInfo.xml><?xml version="1.0" encoding="utf-8"?>
+<p1510:revInfo xmlns:a="http://schemas.openxmlformats.org/drawingml/2006/main" xmlns:r="http://schemas.openxmlformats.org/officeDocument/2006/relationships" xmlns:p1510="http://schemas.microsoft.com/office/powerpoint/2015/10/main"/>
 </file>
 
 <file path=ppt/slideLayouts/slideLayout1.xml><?xml version="1.0" encoding="utf-8"?>
@@ -265,7 +274,7 @@
           <a:p>
             <a:fld id="{EB6AF6D8-C72A-4845-850B-6838A7408591}" type="datetimeFigureOut">
               <a:rPr lang="en-US" smtClean="0"/>
-              <a:t>4/27/2017</a:t>
+              <a:t>5/11/2017</a:t>
             </a:fld>
             <a:endParaRPr lang="en-US"/>
           </a:p>
@@ -463,7 +472,7 @@
           <a:p>
             <a:fld id="{EB6AF6D8-C72A-4845-850B-6838A7408591}" type="datetimeFigureOut">
               <a:rPr lang="en-US" smtClean="0"/>
-              <a:t>4/27/2017</a:t>
+              <a:t>5/11/2017</a:t>
             </a:fld>
             <a:endParaRPr lang="en-US"/>
           </a:p>
@@ -671,7 +680,7 @@
           <a:p>
             <a:fld id="{EB6AF6D8-C72A-4845-850B-6838A7408591}" type="datetimeFigureOut">
               <a:rPr lang="en-US" smtClean="0"/>
-              <a:t>4/27/2017</a:t>
+              <a:t>5/11/2017</a:t>
             </a:fld>
             <a:endParaRPr lang="en-US"/>
           </a:p>
@@ -869,7 +878,7 @@
           <a:p>
             <a:fld id="{EB6AF6D8-C72A-4845-850B-6838A7408591}" type="datetimeFigureOut">
               <a:rPr lang="en-US" smtClean="0"/>
-              <a:t>4/27/2017</a:t>
+              <a:t>5/11/2017</a:t>
             </a:fld>
             <a:endParaRPr lang="en-US"/>
           </a:p>
@@ -1144,7 +1153,7 @@
           <a:p>
             <a:fld id="{EB6AF6D8-C72A-4845-850B-6838A7408591}" type="datetimeFigureOut">
               <a:rPr lang="en-US" smtClean="0"/>
-              <a:t>4/27/2017</a:t>
+              <a:t>5/11/2017</a:t>
             </a:fld>
             <a:endParaRPr lang="en-US"/>
           </a:p>
@@ -1409,7 +1418,7 @@
           <a:p>
             <a:fld id="{EB6AF6D8-C72A-4845-850B-6838A7408591}" type="datetimeFigureOut">
               <a:rPr lang="en-US" smtClean="0"/>
-              <a:t>4/27/2017</a:t>
+              <a:t>5/11/2017</a:t>
             </a:fld>
             <a:endParaRPr lang="en-US"/>
           </a:p>
@@ -1821,7 +1830,7 @@
           <a:p>
             <a:fld id="{EB6AF6D8-C72A-4845-850B-6838A7408591}" type="datetimeFigureOut">
               <a:rPr lang="en-US" smtClean="0"/>
-              <a:t>4/27/2017</a:t>
+              <a:t>5/11/2017</a:t>
             </a:fld>
             <a:endParaRPr lang="en-US"/>
           </a:p>
@@ -1962,7 +1971,7 @@
           <a:p>
             <a:fld id="{EB6AF6D8-C72A-4845-850B-6838A7408591}" type="datetimeFigureOut">
               <a:rPr lang="en-US" smtClean="0"/>
-              <a:t>4/27/2017</a:t>
+              <a:t>5/11/2017</a:t>
             </a:fld>
             <a:endParaRPr lang="en-US"/>
           </a:p>
@@ -2075,7 +2084,7 @@
           <a:p>
             <a:fld id="{EB6AF6D8-C72A-4845-850B-6838A7408591}" type="datetimeFigureOut">
               <a:rPr lang="en-US" smtClean="0"/>
-              <a:t>4/27/2017</a:t>
+              <a:t>5/11/2017</a:t>
             </a:fld>
             <a:endParaRPr lang="en-US"/>
           </a:p>
@@ -2386,7 +2395,7 @@
           <a:p>
             <a:fld id="{EB6AF6D8-C72A-4845-850B-6838A7408591}" type="datetimeFigureOut">
               <a:rPr lang="en-US" smtClean="0"/>
-              <a:t>4/27/2017</a:t>
+              <a:t>5/11/2017</a:t>
             </a:fld>
             <a:endParaRPr lang="en-US"/>
           </a:p>
@@ -2674,7 +2683,7 @@
           <a:p>
             <a:fld id="{EB6AF6D8-C72A-4845-850B-6838A7408591}" type="datetimeFigureOut">
               <a:rPr lang="en-US" smtClean="0"/>
-              <a:t>4/27/2017</a:t>
+              <a:t>5/11/2017</a:t>
             </a:fld>
             <a:endParaRPr lang="en-US"/>
           </a:p>
@@ -2915,7 +2924,7 @@
           <a:p>
             <a:fld id="{EB6AF6D8-C72A-4845-850B-6838A7408591}" type="datetimeFigureOut">
               <a:rPr lang="en-US" smtClean="0"/>
-              <a:t>4/27/2017</a:t>
+              <a:t>5/11/2017</a:t>
             </a:fld>
             <a:endParaRPr lang="en-US"/>
           </a:p>
@@ -4148,30 +4157,25 @@
           </a:bodyPr>
           <a:lstStyle/>
           <a:p>
-            <a:pPr marL="342900" indent="-342900">
-              <a:buAutoNum type="arabicPeriod" startAt="6"/>
-            </a:pPr>
             <a:r>
               <a:rPr lang="en-US" dirty="0"/>
-              <a:t>Open the Data Validation &gt; data files folder.</a:t>
-            </a:r>
-          </a:p>
-          <a:p>
-            <a:pPr marL="342900" indent="-342900">
-              <a:buAutoNum type="arabicPeriod" startAt="6"/>
-            </a:pPr>
+              <a:t>1.   Open the Data Validation &gt; data files folder.</a:t>
+            </a:r>
+          </a:p>
+          <a:p>
             <a:r>
               <a:rPr lang="en-US" dirty="0"/>
-              <a:t>Open and review each file.</a:t>
-            </a:r>
-          </a:p>
-          <a:p>
-            <a:pPr marL="342900" indent="-342900">
-              <a:buAutoNum type="arabicPeriod" startAt="6"/>
-            </a:pPr>
+              <a:t>2.   Open and review each file.</a:t>
+            </a:r>
+          </a:p>
+          <a:p>
+            <a:r>
+              <a:rPr lang="en-US"/>
+              <a:t>3.   Populate </a:t>
+            </a:r>
             <a:r>
               <a:rPr lang="en-US" dirty="0"/>
-              <a:t>Populate each file with your schools data or leave as is and go to next step</a:t>
+              <a:t>each file with your schools data or leave as is and go to next step</a:t>
             </a:r>
           </a:p>
         </p:txBody>

</xml_diff>